<commit_message>
don't know why I miss spell references
</commit_message>
<xml_diff>
--- a/Presentation three js.pptx
+++ b/Presentation three js.pptx
@@ -6503,10 +6503,9 @@
           <a:lstStyle/>
           <a:p>
             <a:r>
-              <a:rPr lang="en-US" dirty="0" err="1"/>
-              <a:t>Referenes</a:t>
-            </a:r>
-            <a:endParaRPr lang="en-US" dirty="0"/>
+              <a:rPr lang="en-US" dirty="0"/>
+              <a:t>References</a:t>
+            </a:r>
           </a:p>
         </p:txBody>
       </p:sp>

</xml_diff>